<commit_message>
Replace Joust with Jetpack Joyride in final project overview slides.
</commit_message>
<xml_diff>
--- a/ClassMaterials/EventBasedGameLoop/Slides/Part1-EventBasedGameLoop.pptx
+++ b/ClassMaterials/EventBasedGameLoop/Slides/Part1-EventBasedGameLoop.pptx
@@ -299,7 +299,7 @@
             <a:fld id="{68AFFCC9-E980-4A2E-8F84-91052C1F2C22}" type="datetime1">
               <a:rPr lang="en-US"/>
               <a:pPr/>
-              <a:t>1/23/2023</a:t>
+              <a:t>10/12/2023</a:t>
             </a:fld>
             <a:endParaRPr lang="en-US"/>
           </a:p>
@@ -528,7 +528,7 @@
             <a:fld id="{C4411CED-79EF-4046-B79B-F8927B54B6B0}" type="datetime1">
               <a:rPr lang="en-US"/>
               <a:pPr/>
-              <a:t>1/23/2023</a:t>
+              <a:t>10/12/2023</a:t>
             </a:fld>
             <a:endParaRPr lang="en-US"/>
           </a:p>
@@ -1154,7 +1154,7 @@
             <a:fld id="{43E6E5DC-7A70-4CAB-B8CA-FD7CFBA6DDCF}" type="datetime1">
               <a:rPr lang="en-US" smtClean="0"/>
               <a:pPr/>
-              <a:t>1/23/2023</a:t>
+              <a:t>10/12/2023</a:t>
             </a:fld>
             <a:endParaRPr lang="en-US"/>
           </a:p>
@@ -1327,7 +1327,7 @@
             <a:fld id="{34C58A64-F6CF-4D4F-A14E-4E9A6689521C}" type="datetime1">
               <a:rPr lang="en-US" smtClean="0"/>
               <a:pPr/>
-              <a:t>1/23/2023</a:t>
+              <a:t>10/12/2023</a:t>
             </a:fld>
             <a:endParaRPr lang="en-US"/>
           </a:p>
@@ -1510,7 +1510,7 @@
             <a:fld id="{28A961FD-7946-4EF3-8B09-2E96C5099CE1}" type="datetime1">
               <a:rPr lang="en-US" smtClean="0"/>
               <a:pPr/>
-              <a:t>1/23/2023</a:t>
+              <a:t>10/12/2023</a:t>
             </a:fld>
             <a:endParaRPr lang="en-US"/>
           </a:p>
@@ -1683,7 +1683,7 @@
             <a:fld id="{410E03A8-3A50-4824-93B1-5AB2817A85E6}" type="datetime1">
               <a:rPr lang="en-US" smtClean="0"/>
               <a:pPr/>
-              <a:t>1/23/2023</a:t>
+              <a:t>10/12/2023</a:t>
             </a:fld>
             <a:endParaRPr lang="en-US"/>
           </a:p>
@@ -1933,7 +1933,7 @@
             <a:fld id="{69EE78C3-2E3E-4EDD-A8FC-A11FEA9CDF04}" type="datetime1">
               <a:rPr lang="en-US" smtClean="0"/>
               <a:pPr/>
-              <a:t>1/23/2023</a:t>
+              <a:t>10/12/2023</a:t>
             </a:fld>
             <a:endParaRPr lang="en-US"/>
           </a:p>
@@ -2223,7 +2223,7 @@
             <a:fld id="{9CAD6738-AE48-490E-BA60-16B31C3E5798}" type="datetime1">
               <a:rPr lang="en-US" smtClean="0"/>
               <a:pPr/>
-              <a:t>1/23/2023</a:t>
+              <a:t>10/12/2023</a:t>
             </a:fld>
             <a:endParaRPr lang="en-US"/>
           </a:p>
@@ -2647,7 +2647,7 @@
             <a:fld id="{12137309-80BC-4890-B91A-AB9885E172E5}" type="datetime1">
               <a:rPr lang="en-US" smtClean="0"/>
               <a:pPr/>
-              <a:t>1/23/2023</a:t>
+              <a:t>10/12/2023</a:t>
             </a:fld>
             <a:endParaRPr lang="en-US"/>
           </a:p>
@@ -2769,7 +2769,7 @@
             <a:fld id="{79C16A63-0F78-4E9D-81E4-A84E1F25A0A3}" type="datetime1">
               <a:rPr lang="en-US" smtClean="0"/>
               <a:pPr/>
-              <a:t>1/23/2023</a:t>
+              <a:t>10/12/2023</a:t>
             </a:fld>
             <a:endParaRPr lang="en-US"/>
           </a:p>
@@ -2869,7 +2869,7 @@
             <a:fld id="{DC5FF9E9-979C-4422-A1BB-1DC64426F0DA}" type="datetime1">
               <a:rPr lang="en-US" smtClean="0"/>
               <a:pPr/>
-              <a:t>1/23/2023</a:t>
+              <a:t>10/12/2023</a:t>
             </a:fld>
             <a:endParaRPr lang="en-US"/>
           </a:p>
@@ -3149,7 +3149,7 @@
             <a:fld id="{B9B7020D-910B-4676-A902-AD52382F28B6}" type="datetime1">
               <a:rPr lang="en-US" smtClean="0"/>
               <a:pPr/>
-              <a:t>1/23/2023</a:t>
+              <a:t>10/12/2023</a:t>
             </a:fld>
             <a:endParaRPr lang="en-US"/>
           </a:p>
@@ -3406,7 +3406,7 @@
             <a:fld id="{4695FF79-924D-47D6-A727-6A03000C0C91}" type="datetime1">
               <a:rPr lang="en-US" smtClean="0"/>
               <a:pPr/>
-              <a:t>1/23/2023</a:t>
+              <a:t>10/12/2023</a:t>
             </a:fld>
             <a:endParaRPr lang="en-US"/>
           </a:p>
@@ -3622,7 +3622,7 @@
             <a:fld id="{A51E304D-C692-4D58-A925-D35D66927263}" type="datetime1">
               <a:rPr lang="en-US" smtClean="0"/>
               <a:pPr/>
-              <a:t>1/23/2023</a:t>
+              <a:t>10/12/2023</a:t>
             </a:fld>
             <a:endParaRPr lang="en-US"/>
           </a:p>
@@ -4134,7 +4134,7 @@
           <a:lstStyle/>
           <a:p>
             <a:r>
-              <a:rPr lang="en-US" sz="2400">
+              <a:rPr lang="en-US" sz="2400" dirty="0">
                 <a:solidFill>
                   <a:srgbClr val="FFFFFF"/>
                 </a:solidFill>
@@ -4142,7 +4142,7 @@
               <a:t>The </a:t>
             </a:r>
             <a:r>
-              <a:rPr lang="en-US" sz="2400" i="1">
+              <a:rPr lang="en-US" sz="2400" i="1" dirty="0">
                 <a:solidFill>
                   <a:srgbClr val="FFFFFF"/>
                 </a:solidFill>
@@ -4150,7 +4150,7 @@
               <a:t>git</a:t>
             </a:r>
             <a:r>
-              <a:rPr lang="en-US" sz="2400">
+              <a:rPr lang="en-US" sz="2400" dirty="0">
                 <a:solidFill>
                   <a:srgbClr val="FFFFFF"/>
                 </a:solidFill>
@@ -4164,10 +4164,10 @@
               <a:buChar char="•"/>
             </a:pPr>
             <a:r>
-              <a:rPr lang="en-US" sz="2400" i="1" err="1"/>
+              <a:rPr lang="en-US" sz="2400" i="1" dirty="0" err="1"/>
               <a:t>PracticeEventBasedGameLoop</a:t>
             </a:r>
-            <a:endParaRPr lang="en-US" sz="2400" i="1"/>
+            <a:endParaRPr lang="en-US" sz="2400" i="1" dirty="0"/>
           </a:p>
           <a:p>
             <a:pPr marL="342900" indent="-342900">
@@ -4175,10 +4175,10 @@
               <a:buChar char="•"/>
             </a:pPr>
             <a:r>
-              <a:rPr lang="en-US" sz="2400" i="1" err="1"/>
-              <a:t>PracticeEventBasedGameLoopSolution</a:t>
-            </a:r>
-            <a:endParaRPr lang="en-US" sz="2400" i="1"/>
+              <a:rPr lang="en-US" sz="2400" i="1" dirty="0" err="1"/>
+              <a:t>PracticeSolutionEventBasedGameLoop</a:t>
+            </a:r>
+            <a:endParaRPr lang="en-US" sz="2400" i="1" dirty="0"/>
           </a:p>
         </p:txBody>
       </p:sp>
@@ -4708,7 +4708,12 @@
             <p:ph type="title"/>
           </p:nvPr>
         </p:nvSpPr>
-        <p:spPr/>
+        <p:spPr>
+          <a:xfrm>
+            <a:off x="457200" y="283782"/>
+            <a:ext cx="8229600" cy="1143000"/>
+          </a:xfrm>
+        </p:spPr>
         <p:txBody>
           <a:bodyPr>
             <a:normAutofit fontScale="90000"/>
@@ -4749,7 +4754,7 @@
               <a:rPr lang="en-US" dirty="0">
                 <a:hlinkClick r:id="rId2"/>
               </a:rPr>
-              <a:t>CSSE220 Joust Team Project</a:t>
+              <a:t>CSSE220 Jetpack Joyride Team Project</a:t>
             </a:r>
             <a:endParaRPr lang="en-US" dirty="0"/>
           </a:p>
@@ -4799,32 +4804,49 @@
       </p:sp>
       <p:pic>
         <p:nvPicPr>
-          <p:cNvPr id="5" name="Picture 4">
+          <p:cNvPr id="1026" name="Picture 2">
             <a:extLst>
               <a:ext uri="{FF2B5EF4-FFF2-40B4-BE49-F238E27FC236}">
-                <a16:creationId xmlns:a16="http://schemas.microsoft.com/office/drawing/2014/main" id="{C919835D-657C-8DA8-81AF-8C6263D50E7F}"/>
+                <a16:creationId xmlns:a16="http://schemas.microsoft.com/office/drawing/2014/main" id="{924F3E11-B7ED-5BEE-1DEB-4A58C468EE5D}"/>
               </a:ext>
             </a:extLst>
           </p:cNvPr>
           <p:cNvPicPr>
-            <a:picLocks noChangeAspect="1"/>
+            <a:picLocks noChangeAspect="1" noChangeArrowheads="1"/>
           </p:cNvPicPr>
           <p:nvPr/>
         </p:nvPicPr>
         <p:blipFill>
-          <a:blip r:embed="rId4"/>
+          <a:blip r:embed="rId4">
+            <a:extLst>
+              <a:ext uri="{28A0092B-C50C-407E-A947-70E740481C1C}">
+                <a14:useLocalDpi xmlns:a14="http://schemas.microsoft.com/office/drawing/2010/main" val="0"/>
+              </a:ext>
+            </a:extLst>
+          </a:blip>
+          <a:srcRect/>
           <a:stretch>
             <a:fillRect/>
           </a:stretch>
         </p:blipFill>
-        <p:spPr>
+        <p:spPr bwMode="auto">
           <a:xfrm>
-            <a:off x="1371600" y="2209800"/>
-            <a:ext cx="3564900" cy="2895600"/>
+            <a:off x="2728913" y="2205038"/>
+            <a:ext cx="3686175" cy="2447925"/>
           </a:xfrm>
           <a:prstGeom prst="rect">
             <a:avLst/>
           </a:prstGeom>
+          <a:noFill/>
+          <a:extLst>
+            <a:ext uri="{909E8E84-426E-40DD-AFC4-6F175D3DCCD1}">
+              <a14:hiddenFill xmlns:a14="http://schemas.microsoft.com/office/drawing/2010/main">
+                <a:solidFill>
+                  <a:srgbClr val="FFFFFF"/>
+                </a:solidFill>
+              </a14:hiddenFill>
+            </a:ext>
+          </a:extLst>
         </p:spPr>
       </p:pic>
     </p:spTree>
@@ -5689,6 +5711,17 @@
 </file>
 
 <file path=customXml/item1.xml><?xml version="1.0" encoding="utf-8"?>
+<p:properties xmlns:p="http://schemas.microsoft.com/office/2006/metadata/properties" xmlns:xsi="http://www.w3.org/2001/XMLSchema-instance" xmlns:pc="http://schemas.microsoft.com/office/infopath/2007/PartnerControls">
+  <documentManagement>
+    <TaxCatchAll xmlns="820f9cb1-409d-4c4b-8197-1d4f7dd48124" xsi:nil="true"/>
+    <lcf76f155ced4ddcb4097134ff3c332f xmlns="08600313-7276-4ca7-b5d3-7d86193ee0ac">
+      <Terms xmlns="http://schemas.microsoft.com/office/infopath/2007/PartnerControls"/>
+    </lcf76f155ced4ddcb4097134ff3c332f>
+  </documentManagement>
+</p:properties>
+</file>
+
+<file path=customXml/item2.xml><?xml version="1.0" encoding="utf-8"?>
 <ct:contentTypeSchema xmlns:ct="http://schemas.microsoft.com/office/2006/metadata/contentType" xmlns:ma="http://schemas.microsoft.com/office/2006/metadata/properties/metaAttributes" ct:_="" ma:_="" ma:contentTypeName="Document" ma:contentTypeID="0x0101004285D81DBE5F5A448E892B34D6B8CF20" ma:contentTypeVersion="8" ma:contentTypeDescription="Create a new document." ma:contentTypeScope="" ma:versionID="ecce54155d2ea7caa9aed06c8b6b9867">
   <xsd:schema xmlns:xsd="http://www.w3.org/2001/XMLSchema" xmlns:xs="http://www.w3.org/2001/XMLSchema" xmlns:p="http://schemas.microsoft.com/office/2006/metadata/properties" xmlns:ns2="08600313-7276-4ca7-b5d3-7d86193ee0ac" xmlns:ns3="820f9cb1-409d-4c4b-8197-1d4f7dd48124" targetNamespace="http://schemas.microsoft.com/office/2006/metadata/properties" ma:root="true" ma:fieldsID="bfd7385540b70b2fe84ac888cc214377" ns2:_="" ns3:_="">
     <xsd:import namespace="08600313-7276-4ca7-b5d3-7d86193ee0ac"/>
@@ -5865,17 +5898,6 @@
 </ct:contentTypeSchema>
 </file>
 
-<file path=customXml/item2.xml><?xml version="1.0" encoding="utf-8"?>
-<p:properties xmlns:p="http://schemas.microsoft.com/office/2006/metadata/properties" xmlns:xsi="http://www.w3.org/2001/XMLSchema-instance" xmlns:pc="http://schemas.microsoft.com/office/infopath/2007/PartnerControls">
-  <documentManagement>
-    <TaxCatchAll xmlns="820f9cb1-409d-4c4b-8197-1d4f7dd48124" xsi:nil="true"/>
-    <lcf76f155ced4ddcb4097134ff3c332f xmlns="08600313-7276-4ca7-b5d3-7d86193ee0ac">
-      <Terms xmlns="http://schemas.microsoft.com/office/infopath/2007/PartnerControls"/>
-    </lcf76f155ced4ddcb4097134ff3c332f>
-  </documentManagement>
-</p:properties>
-</file>
-
 <file path=customXml/item3.xml><?xml version="1.0" encoding="utf-8"?>
 <?mso-contentType ?>
 <FormTemplates xmlns="http://schemas.microsoft.com/sharepoint/v3/contenttype/forms">
@@ -5886,6 +5908,23 @@
 </file>
 
 <file path=customXml/itemProps1.xml><?xml version="1.0" encoding="utf-8"?>
+<ds:datastoreItem xmlns:ds="http://schemas.openxmlformats.org/officeDocument/2006/customXml" ds:itemID="{5A9CC447-D9E4-472B-8F77-5984014F62A7}">
+  <ds:schemaRefs>
+    <ds:schemaRef ds:uri="08600313-7276-4ca7-b5d3-7d86193ee0ac"/>
+    <ds:schemaRef ds:uri="820f9cb1-409d-4c4b-8197-1d4f7dd48124"/>
+    <ds:schemaRef ds:uri="http://purl.org/dc/dcmitype/"/>
+    <ds:schemaRef ds:uri="http://purl.org/dc/elements/1.1/"/>
+    <ds:schemaRef ds:uri="http://purl.org/dc/terms/"/>
+    <ds:schemaRef ds:uri="http://schemas.microsoft.com/office/2006/documentManagement/types"/>
+    <ds:schemaRef ds:uri="http://schemas.microsoft.com/office/2006/metadata/properties"/>
+    <ds:schemaRef ds:uri="http://schemas.microsoft.com/office/infopath/2007/PartnerControls"/>
+    <ds:schemaRef ds:uri="http://schemas.openxmlformats.org/package/2006/metadata/core-properties"/>
+    <ds:schemaRef ds:uri="http://www.w3.org/XML/1998/namespace"/>
+  </ds:schemaRefs>
+</ds:datastoreItem>
+</file>
+
+<file path=customXml/itemProps2.xml><?xml version="1.0" encoding="utf-8"?>
 <ds:datastoreItem xmlns:ds="http://schemas.openxmlformats.org/officeDocument/2006/customXml" ds:itemID="{54EB4FC6-A2A2-40B0-A84A-BBFCE3674D6D}">
   <ds:schemaRefs>
     <ds:schemaRef ds:uri="08600313-7276-4ca7-b5d3-7d86193ee0ac"/>
@@ -5904,23 +5943,6 @@
 </ds:datastoreItem>
 </file>
 
-<file path=customXml/itemProps2.xml><?xml version="1.0" encoding="utf-8"?>
-<ds:datastoreItem xmlns:ds="http://schemas.openxmlformats.org/officeDocument/2006/customXml" ds:itemID="{5A9CC447-D9E4-472B-8F77-5984014F62A7}">
-  <ds:schemaRefs>
-    <ds:schemaRef ds:uri="08600313-7276-4ca7-b5d3-7d86193ee0ac"/>
-    <ds:schemaRef ds:uri="820f9cb1-409d-4c4b-8197-1d4f7dd48124"/>
-    <ds:schemaRef ds:uri="http://purl.org/dc/dcmitype/"/>
-    <ds:schemaRef ds:uri="http://purl.org/dc/elements/1.1/"/>
-    <ds:schemaRef ds:uri="http://purl.org/dc/terms/"/>
-    <ds:schemaRef ds:uri="http://schemas.microsoft.com/office/2006/documentManagement/types"/>
-    <ds:schemaRef ds:uri="http://schemas.microsoft.com/office/2006/metadata/properties"/>
-    <ds:schemaRef ds:uri="http://schemas.microsoft.com/office/infopath/2007/PartnerControls"/>
-    <ds:schemaRef ds:uri="http://schemas.openxmlformats.org/package/2006/metadata/core-properties"/>
-    <ds:schemaRef ds:uri="http://www.w3.org/XML/1998/namespace"/>
-  </ds:schemaRefs>
-</ds:datastoreItem>
-</file>
-
 <file path=customXml/itemProps3.xml><?xml version="1.0" encoding="utf-8"?>
 <ds:datastoreItem xmlns:ds="http://schemas.openxmlformats.org/officeDocument/2006/customXml" ds:itemID="{2A7C915E-4009-47CE-94D4-97E75DE59B25}">
   <ds:schemaRefs>

</xml_diff>

<commit_message>
event base game loop slides
</commit_message>
<xml_diff>
--- a/ClassMaterials/EventBasedGameLoop/Slides/Part1-EventBasedGameLoop.pptx
+++ b/ClassMaterials/EventBasedGameLoop/Slides/Part1-EventBasedGameLoop.pptx
@@ -5,17 +5,21 @@
     <p:sldMasterId id="2147484629" r:id="rId4"/>
   </p:sldMasterIdLst>
   <p:notesMasterIdLst>
-    <p:notesMasterId r:id="rId10"/>
+    <p:notesMasterId r:id="rId14"/>
   </p:notesMasterIdLst>
   <p:handoutMasterIdLst>
-    <p:handoutMasterId r:id="rId11"/>
+    <p:handoutMasterId r:id="rId15"/>
   </p:handoutMasterIdLst>
   <p:sldIdLst>
     <p:sldId id="340" r:id="rId5"/>
     <p:sldId id="296" r:id="rId6"/>
     <p:sldId id="304" r:id="rId7"/>
     <p:sldId id="341" r:id="rId8"/>
-    <p:sldId id="336" r:id="rId9"/>
+    <p:sldId id="342" r:id="rId9"/>
+    <p:sldId id="343" r:id="rId10"/>
+    <p:sldId id="336" r:id="rId11"/>
+    <p:sldId id="345" r:id="rId12"/>
+    <p:sldId id="344" r:id="rId13"/>
   </p:sldIdLst>
   <p:sldSz cx="9144000" cy="6858000" type="screen4x3"/>
   <p:notesSz cx="6881813" cy="9296400"/>
@@ -614,7 +618,7 @@
             <a:fld id="{68AFFCC9-E980-4A2E-8F84-91052C1F2C22}" type="datetime1">
               <a:rPr lang="en-US"/>
               <a:pPr/>
-              <a:t>11/21/2023</a:t>
+              <a:t>2/25/2024</a:t>
             </a:fld>
             <a:endParaRPr lang="en-US"/>
           </a:p>
@@ -843,7 +847,7 @@
             <a:fld id="{C4411CED-79EF-4046-B79B-F8927B54B6B0}" type="datetime1">
               <a:rPr lang="en-US"/>
               <a:pPr/>
-              <a:t>11/21/2023</a:t>
+              <a:t>2/25/2024</a:t>
             </a:fld>
             <a:endParaRPr lang="en-US"/>
           </a:p>
@@ -1469,7 +1473,7 @@
             <a:fld id="{43E6E5DC-7A70-4CAB-B8CA-FD7CFBA6DDCF}" type="datetime1">
               <a:rPr lang="en-US" smtClean="0"/>
               <a:pPr/>
-              <a:t>11/21/2023</a:t>
+              <a:t>2/25/2024</a:t>
             </a:fld>
             <a:endParaRPr lang="en-US"/>
           </a:p>
@@ -1642,7 +1646,7 @@
             <a:fld id="{34C58A64-F6CF-4D4F-A14E-4E9A6689521C}" type="datetime1">
               <a:rPr lang="en-US" smtClean="0"/>
               <a:pPr/>
-              <a:t>11/21/2023</a:t>
+              <a:t>2/25/2024</a:t>
             </a:fld>
             <a:endParaRPr lang="en-US"/>
           </a:p>
@@ -1825,7 +1829,7 @@
             <a:fld id="{28A961FD-7946-4EF3-8B09-2E96C5099CE1}" type="datetime1">
               <a:rPr lang="en-US" smtClean="0"/>
               <a:pPr/>
-              <a:t>11/21/2023</a:t>
+              <a:t>2/25/2024</a:t>
             </a:fld>
             <a:endParaRPr lang="en-US"/>
           </a:p>
@@ -1998,7 +2002,7 @@
             <a:fld id="{410E03A8-3A50-4824-93B1-5AB2817A85E6}" type="datetime1">
               <a:rPr lang="en-US" smtClean="0"/>
               <a:pPr/>
-              <a:t>11/21/2023</a:t>
+              <a:t>2/25/2024</a:t>
             </a:fld>
             <a:endParaRPr lang="en-US"/>
           </a:p>
@@ -2248,7 +2252,7 @@
             <a:fld id="{69EE78C3-2E3E-4EDD-A8FC-A11FEA9CDF04}" type="datetime1">
               <a:rPr lang="en-US" smtClean="0"/>
               <a:pPr/>
-              <a:t>11/21/2023</a:t>
+              <a:t>2/25/2024</a:t>
             </a:fld>
             <a:endParaRPr lang="en-US"/>
           </a:p>
@@ -2538,7 +2542,7 @@
             <a:fld id="{9CAD6738-AE48-490E-BA60-16B31C3E5798}" type="datetime1">
               <a:rPr lang="en-US" smtClean="0"/>
               <a:pPr/>
-              <a:t>11/21/2023</a:t>
+              <a:t>2/25/2024</a:t>
             </a:fld>
             <a:endParaRPr lang="en-US"/>
           </a:p>
@@ -2962,7 +2966,7 @@
             <a:fld id="{12137309-80BC-4890-B91A-AB9885E172E5}" type="datetime1">
               <a:rPr lang="en-US" smtClean="0"/>
               <a:pPr/>
-              <a:t>11/21/2023</a:t>
+              <a:t>2/25/2024</a:t>
             </a:fld>
             <a:endParaRPr lang="en-US"/>
           </a:p>
@@ -3084,7 +3088,7 @@
             <a:fld id="{79C16A63-0F78-4E9D-81E4-A84E1F25A0A3}" type="datetime1">
               <a:rPr lang="en-US" smtClean="0"/>
               <a:pPr/>
-              <a:t>11/21/2023</a:t>
+              <a:t>2/25/2024</a:t>
             </a:fld>
             <a:endParaRPr lang="en-US"/>
           </a:p>
@@ -3184,7 +3188,7 @@
             <a:fld id="{DC5FF9E9-979C-4422-A1BB-1DC64426F0DA}" type="datetime1">
               <a:rPr lang="en-US" smtClean="0"/>
               <a:pPr/>
-              <a:t>11/21/2023</a:t>
+              <a:t>2/25/2024</a:t>
             </a:fld>
             <a:endParaRPr lang="en-US"/>
           </a:p>
@@ -3464,7 +3468,7 @@
             <a:fld id="{B9B7020D-910B-4676-A902-AD52382F28B6}" type="datetime1">
               <a:rPr lang="en-US" smtClean="0"/>
               <a:pPr/>
-              <a:t>11/21/2023</a:t>
+              <a:t>2/25/2024</a:t>
             </a:fld>
             <a:endParaRPr lang="en-US"/>
           </a:p>
@@ -3721,7 +3725,7 @@
             <a:fld id="{4695FF79-924D-47D6-A727-6A03000C0C91}" type="datetime1">
               <a:rPr lang="en-US" smtClean="0"/>
               <a:pPr/>
-              <a:t>11/21/2023</a:t>
+              <a:t>2/25/2024</a:t>
             </a:fld>
             <a:endParaRPr lang="en-US"/>
           </a:p>
@@ -3937,7 +3941,7 @@
             <a:fld id="{A51E304D-C692-4D58-A925-D35D66927263}" type="datetime1">
               <a:rPr lang="en-US" smtClean="0"/>
               <a:pPr/>
-              <a:t>11/21/2023</a:t>
+              <a:t>2/25/2024</a:t>
             </a:fld>
             <a:endParaRPr lang="en-US"/>
           </a:p>
@@ -4605,7 +4609,7 @@
                   <a:srgbClr val="FFFF00"/>
                 </a:highlight>
               </a:rPr>
-              <a:t>__________</a:t>
+              <a:t>____________</a:t>
             </a:r>
           </a:p>
         </p:txBody>
@@ -4854,7 +4858,7 @@
           <a:p>
             <a:r>
               <a:rPr lang="en-US" sz="2000" dirty="0"/>
-              <a:t>Winter 2023-24 Team Sheet:</a:t>
+              <a:t>Spring 24 Team Sheet:</a:t>
             </a:r>
           </a:p>
           <a:p>
@@ -4921,7 +4925,7 @@
 </file>
 
 <file path=ppt/slides/slide4.xml><?xml version="1.0" encoding="utf-8"?>
-<p:sld xmlns:a="http://schemas.openxmlformats.org/drawingml/2006/main" xmlns:r="http://schemas.openxmlformats.org/officeDocument/2006/relationships" xmlns:p="http://schemas.openxmlformats.org/presentationml/2006/main">
+<p:sld xmlns:a="http://schemas.openxmlformats.org/drawingml/2006/main" xmlns:r="http://schemas.openxmlformats.org/officeDocument/2006/relationships" xmlns:p="http://schemas.openxmlformats.org/presentationml/2006/main" show="0">
   <p:cSld>
     <p:spTree>
       <p:nvGrpSpPr>
@@ -4964,101 +4968,6 @@
           </a:p>
         </p:txBody>
       </p:sp>
-      <p:pic>
-        <p:nvPicPr>
-          <p:cNvPr id="5" name="Picture 4">
-            <a:extLst>
-              <a:ext uri="{FF2B5EF4-FFF2-40B4-BE49-F238E27FC236}">
-                <a16:creationId xmlns:a16="http://schemas.microsoft.com/office/drawing/2014/main" id="{0022762A-BDDE-B647-CFD6-5593E02D4F87}"/>
-              </a:ext>
-            </a:extLst>
-          </p:cNvPr>
-          <p:cNvPicPr>
-            <a:picLocks noChangeAspect="1"/>
-          </p:cNvPicPr>
-          <p:nvPr/>
-        </p:nvPicPr>
-        <p:blipFill>
-          <a:blip r:embed="rId2"/>
-          <a:stretch>
-            <a:fillRect/>
-          </a:stretch>
-        </p:blipFill>
-        <p:spPr>
-          <a:xfrm>
-            <a:off x="737651" y="1781127"/>
-            <a:ext cx="6592220" cy="895475"/>
-          </a:xfrm>
-          <a:prstGeom prst="rect">
-            <a:avLst/>
-          </a:prstGeom>
-        </p:spPr>
-      </p:pic>
-      <p:pic>
-        <p:nvPicPr>
-          <p:cNvPr id="8" name="Picture 7">
-            <a:extLst>
-              <a:ext uri="{FF2B5EF4-FFF2-40B4-BE49-F238E27FC236}">
-                <a16:creationId xmlns:a16="http://schemas.microsoft.com/office/drawing/2014/main" id="{87AD786A-87C7-320D-66EA-543DC234C928}"/>
-              </a:ext>
-            </a:extLst>
-          </p:cNvPr>
-          <p:cNvPicPr>
-            <a:picLocks noChangeAspect="1"/>
-          </p:cNvPicPr>
-          <p:nvPr/>
-        </p:nvPicPr>
-        <p:blipFill>
-          <a:blip r:embed="rId3"/>
-          <a:stretch>
-            <a:fillRect/>
-          </a:stretch>
-        </p:blipFill>
-        <p:spPr>
-          <a:xfrm>
-            <a:off x="737651" y="3360676"/>
-            <a:ext cx="6592220" cy="2715004"/>
-          </a:xfrm>
-          <a:prstGeom prst="rect">
-            <a:avLst/>
-          </a:prstGeom>
-        </p:spPr>
-      </p:pic>
-      <p:sp>
-        <p:nvSpPr>
-          <p:cNvPr id="9" name="TextBox 8">
-            <a:extLst>
-              <a:ext uri="{FF2B5EF4-FFF2-40B4-BE49-F238E27FC236}">
-                <a16:creationId xmlns:a16="http://schemas.microsoft.com/office/drawing/2014/main" id="{BE0445D2-2E7A-539C-203E-D59382B84534}"/>
-              </a:ext>
-            </a:extLst>
-          </p:cNvPr>
-          <p:cNvSpPr txBox="1"/>
-          <p:nvPr/>
-        </p:nvSpPr>
-        <p:spPr>
-          <a:xfrm>
-            <a:off x="970671" y="1026942"/>
-            <a:ext cx="5008098" cy="369332"/>
-          </a:xfrm>
-          <a:prstGeom prst="rect">
-            <a:avLst/>
-          </a:prstGeom>
-          <a:noFill/>
-        </p:spPr>
-        <p:txBody>
-          <a:bodyPr wrap="square" rtlCol="0">
-            <a:spAutoFit/>
-          </a:bodyPr>
-          <a:lstStyle/>
-          <a:p>
-            <a:r>
-              <a:rPr lang="en-US" dirty="0"/>
-              <a:t>Screenshots of teams formed thus far</a:t>
-            </a:r>
-          </a:p>
-        </p:txBody>
-      </p:sp>
     </p:spTree>
     <p:extLst>
       <p:ext uri="{BB962C8B-B14F-4D97-AF65-F5344CB8AC3E}">
@@ -5073,6 +4982,132 @@
 </file>
 
 <file path=ppt/slides/slide5.xml><?xml version="1.0" encoding="utf-8"?>
+<p:sld xmlns:a="http://schemas.openxmlformats.org/drawingml/2006/main" xmlns:r="http://schemas.openxmlformats.org/officeDocument/2006/relationships" xmlns:p="http://schemas.openxmlformats.org/presentationml/2006/main" show="0">
+  <p:cSld>
+    <p:spTree>
+      <p:nvGrpSpPr>
+        <p:cNvPr id="1" name=""/>
+        <p:cNvGrpSpPr/>
+        <p:nvPr/>
+      </p:nvGrpSpPr>
+      <p:grpSpPr>
+        <a:xfrm>
+          <a:off x="0" y="0"/>
+          <a:ext cx="0" cy="0"/>
+          <a:chOff x="0" y="0"/>
+          <a:chExt cx="0" cy="0"/>
+        </a:xfrm>
+      </p:grpSpPr>
+      <p:sp>
+        <p:nvSpPr>
+          <p:cNvPr id="2" name="Title 1"/>
+          <p:cNvSpPr>
+            <a:spLocks noGrp="1"/>
+          </p:cNvSpPr>
+          <p:nvPr>
+            <p:ph type="title"/>
+          </p:nvPr>
+        </p:nvSpPr>
+        <p:spPr>
+          <a:xfrm>
+            <a:off x="457199" y="0"/>
+            <a:ext cx="8229600" cy="782320"/>
+          </a:xfrm>
+        </p:spPr>
+        <p:txBody>
+          <a:bodyPr/>
+          <a:lstStyle/>
+          <a:p>
+            <a:r>
+              <a:rPr lang="en-US" dirty="0"/>
+              <a:t>Final Project Introduction - 02</a:t>
+            </a:r>
+          </a:p>
+        </p:txBody>
+      </p:sp>
+    </p:spTree>
+    <p:extLst>
+      <p:ext uri="{BB962C8B-B14F-4D97-AF65-F5344CB8AC3E}">
+        <p14:creationId xmlns:p14="http://schemas.microsoft.com/office/powerpoint/2010/main" val="542567056"/>
+      </p:ext>
+    </p:extLst>
+  </p:cSld>
+  <p:clrMapOvr>
+    <a:masterClrMapping/>
+  </p:clrMapOvr>
+</p:sld>
+</file>
+
+<file path=ppt/slides/slide6.xml><?xml version="1.0" encoding="utf-8"?>
+<p:sld xmlns:a="http://schemas.openxmlformats.org/drawingml/2006/main" xmlns:r="http://schemas.openxmlformats.org/officeDocument/2006/relationships" xmlns:p="http://schemas.openxmlformats.org/presentationml/2006/main" show="0">
+  <p:cSld>
+    <p:spTree>
+      <p:nvGrpSpPr>
+        <p:cNvPr id="1" name="">
+          <a:extLst>
+            <a:ext uri="{FF2B5EF4-FFF2-40B4-BE49-F238E27FC236}">
+              <a16:creationId xmlns:a16="http://schemas.microsoft.com/office/drawing/2014/main" id="{3BA00FB1-6EF1-2542-4E10-6931AEC844B1}"/>
+            </a:ext>
+          </a:extLst>
+        </p:cNvPr>
+        <p:cNvGrpSpPr/>
+        <p:nvPr/>
+      </p:nvGrpSpPr>
+      <p:grpSpPr>
+        <a:xfrm>
+          <a:off x="0" y="0"/>
+          <a:ext cx="0" cy="0"/>
+          <a:chOff x="0" y="0"/>
+          <a:chExt cx="0" cy="0"/>
+        </a:xfrm>
+      </p:grpSpPr>
+      <p:sp>
+        <p:nvSpPr>
+          <p:cNvPr id="2" name="Title 1">
+            <a:extLst>
+              <a:ext uri="{FF2B5EF4-FFF2-40B4-BE49-F238E27FC236}">
+                <a16:creationId xmlns:a16="http://schemas.microsoft.com/office/drawing/2014/main" id="{D04CB90B-7D1D-8E47-6C81-BDAEF400982D}"/>
+              </a:ext>
+            </a:extLst>
+          </p:cNvPr>
+          <p:cNvSpPr>
+            <a:spLocks noGrp="1"/>
+          </p:cNvSpPr>
+          <p:nvPr>
+            <p:ph type="title"/>
+          </p:nvPr>
+        </p:nvSpPr>
+        <p:spPr>
+          <a:xfrm>
+            <a:off x="457199" y="0"/>
+            <a:ext cx="8229600" cy="782320"/>
+          </a:xfrm>
+        </p:spPr>
+        <p:txBody>
+          <a:bodyPr/>
+          <a:lstStyle/>
+          <a:p>
+            <a:r>
+              <a:rPr lang="en-US" dirty="0"/>
+              <a:t>Final Project Introduction - 03</a:t>
+            </a:r>
+          </a:p>
+        </p:txBody>
+      </p:sp>
+    </p:spTree>
+    <p:extLst>
+      <p:ext uri="{BB962C8B-B14F-4D97-AF65-F5344CB8AC3E}">
+        <p14:creationId xmlns:p14="http://schemas.microsoft.com/office/powerpoint/2010/main" val="2373562427"/>
+      </p:ext>
+    </p:extLst>
+  </p:cSld>
+  <p:clrMapOvr>
+    <a:masterClrMapping/>
+  </p:clrMapOvr>
+</p:sld>
+</file>
+
+<file path=ppt/slides/slide7.xml><?xml version="1.0" encoding="utf-8"?>
 <p:sld xmlns:a="http://schemas.openxmlformats.org/drawingml/2006/main" xmlns:r="http://schemas.openxmlformats.org/officeDocument/2006/relationships" xmlns:p="http://schemas.openxmlformats.org/presentationml/2006/main">
   <p:cSld>
     <p:spTree>
@@ -5228,6 +5263,208 @@
     <p:extLst>
       <p:ext uri="{BB962C8B-B14F-4D97-AF65-F5344CB8AC3E}">
         <p14:creationId xmlns:p14="http://schemas.microsoft.com/office/powerpoint/2010/main" val="2808992108"/>
+      </p:ext>
+    </p:extLst>
+  </p:cSld>
+  <p:clrMapOvr>
+    <a:masterClrMapping/>
+  </p:clrMapOvr>
+</p:sld>
+</file>
+
+<file path=ppt/slides/slide8.xml><?xml version="1.0" encoding="utf-8"?>
+<p:sld xmlns:a="http://schemas.openxmlformats.org/drawingml/2006/main" xmlns:r="http://schemas.openxmlformats.org/officeDocument/2006/relationships" xmlns:p="http://schemas.openxmlformats.org/presentationml/2006/main">
+  <p:cSld>
+    <p:spTree>
+      <p:nvGrpSpPr>
+        <p:cNvPr id="1" name=""/>
+        <p:cNvGrpSpPr/>
+        <p:nvPr/>
+      </p:nvGrpSpPr>
+      <p:grpSpPr>
+        <a:xfrm>
+          <a:off x="0" y="0"/>
+          <a:ext cx="0" cy="0"/>
+          <a:chOff x="0" y="0"/>
+          <a:chExt cx="0" cy="0"/>
+        </a:xfrm>
+      </p:grpSpPr>
+      <p:sp>
+        <p:nvSpPr>
+          <p:cNvPr id="5" name="TextBox 4">
+            <a:extLst>
+              <a:ext uri="{FF2B5EF4-FFF2-40B4-BE49-F238E27FC236}">
+                <a16:creationId xmlns:a16="http://schemas.microsoft.com/office/drawing/2014/main" id="{5984159E-3042-D814-0683-4FC07015CDE2}"/>
+              </a:ext>
+            </a:extLst>
+          </p:cNvPr>
+          <p:cNvSpPr txBox="1"/>
+          <p:nvPr/>
+        </p:nvSpPr>
+        <p:spPr>
+          <a:xfrm>
+            <a:off x="2286000" y="6119614"/>
+            <a:ext cx="4572000" cy="646331"/>
+          </a:xfrm>
+          <a:prstGeom prst="rect">
+            <a:avLst/>
+          </a:prstGeom>
+          <a:noFill/>
+        </p:spPr>
+        <p:txBody>
+          <a:bodyPr wrap="square">
+            <a:spAutoFit/>
+          </a:bodyPr>
+          <a:lstStyle/>
+          <a:p>
+            <a:r>
+              <a:rPr lang="en-US" dirty="0">
+                <a:hlinkClick r:id="rId2"/>
+              </a:rPr>
+              <a:t>https://youtu.be/NVFNg7ysCgg</a:t>
+            </a:r>
+            <a:endParaRPr lang="en-US" dirty="0"/>
+          </a:p>
+          <a:p>
+            <a:endParaRPr lang="en-US" dirty="0"/>
+          </a:p>
+        </p:txBody>
+      </p:sp>
+      <p:pic>
+        <p:nvPicPr>
+          <p:cNvPr id="9" name="Picture 8">
+            <a:extLst>
+              <a:ext uri="{FF2B5EF4-FFF2-40B4-BE49-F238E27FC236}">
+                <a16:creationId xmlns:a16="http://schemas.microsoft.com/office/drawing/2014/main" id="{1EAC2628-2699-3B0A-47B8-14312FBC283D}"/>
+              </a:ext>
+            </a:extLst>
+          </p:cNvPr>
+          <p:cNvPicPr>
+            <a:picLocks noChangeAspect="1"/>
+          </p:cNvPicPr>
+          <p:nvPr/>
+        </p:nvPicPr>
+        <p:blipFill>
+          <a:blip r:embed="rId3"/>
+          <a:stretch>
+            <a:fillRect/>
+          </a:stretch>
+        </p:blipFill>
+        <p:spPr>
+          <a:xfrm>
+            <a:off x="1318758" y="355861"/>
+            <a:ext cx="6506483" cy="5353797"/>
+          </a:xfrm>
+          <a:prstGeom prst="rect">
+            <a:avLst/>
+          </a:prstGeom>
+        </p:spPr>
+      </p:pic>
+    </p:spTree>
+    <p:extLst>
+      <p:ext uri="{BB962C8B-B14F-4D97-AF65-F5344CB8AC3E}">
+        <p14:creationId xmlns:p14="http://schemas.microsoft.com/office/powerpoint/2010/main" val="2188168420"/>
+      </p:ext>
+    </p:extLst>
+  </p:cSld>
+  <p:clrMapOvr>
+    <a:masterClrMapping/>
+  </p:clrMapOvr>
+</p:sld>
+</file>
+
+<file path=ppt/slides/slide9.xml><?xml version="1.0" encoding="utf-8"?>
+<p:sld xmlns:a="http://schemas.openxmlformats.org/drawingml/2006/main" xmlns:r="http://schemas.openxmlformats.org/officeDocument/2006/relationships" xmlns:p="http://schemas.openxmlformats.org/presentationml/2006/main">
+  <p:cSld>
+    <p:spTree>
+      <p:nvGrpSpPr>
+        <p:cNvPr id="1" name=""/>
+        <p:cNvGrpSpPr/>
+        <p:nvPr/>
+      </p:nvGrpSpPr>
+      <p:grpSpPr>
+        <a:xfrm>
+          <a:off x="0" y="0"/>
+          <a:ext cx="0" cy="0"/>
+          <a:chOff x="0" y="0"/>
+          <a:chExt cx="0" cy="0"/>
+        </a:xfrm>
+      </p:grpSpPr>
+      <p:sp>
+        <p:nvSpPr>
+          <p:cNvPr id="6" name="TextBox 5">
+            <a:extLst>
+              <a:ext uri="{FF2B5EF4-FFF2-40B4-BE49-F238E27FC236}">
+                <a16:creationId xmlns:a16="http://schemas.microsoft.com/office/drawing/2014/main" id="{3A6C104F-316F-2306-8A21-8AB8C284F87E}"/>
+              </a:ext>
+            </a:extLst>
+          </p:cNvPr>
+          <p:cNvSpPr txBox="1"/>
+          <p:nvPr/>
+        </p:nvSpPr>
+        <p:spPr>
+          <a:xfrm>
+            <a:off x="2519680" y="5798234"/>
+            <a:ext cx="4572000" cy="646331"/>
+          </a:xfrm>
+          <a:prstGeom prst="rect">
+            <a:avLst/>
+          </a:prstGeom>
+          <a:noFill/>
+        </p:spPr>
+        <p:txBody>
+          <a:bodyPr wrap="square">
+            <a:spAutoFit/>
+          </a:bodyPr>
+          <a:lstStyle/>
+          <a:p>
+            <a:r>
+              <a:rPr lang="en-US" dirty="0">
+                <a:hlinkClick r:id="rId2"/>
+              </a:rPr>
+              <a:t>https://youtu.be/_777kvznYCA</a:t>
+            </a:r>
+            <a:endParaRPr lang="en-US" dirty="0"/>
+          </a:p>
+          <a:p>
+            <a:endParaRPr lang="en-US" dirty="0"/>
+          </a:p>
+        </p:txBody>
+      </p:sp>
+      <p:pic>
+        <p:nvPicPr>
+          <p:cNvPr id="11" name="Picture 10">
+            <a:extLst>
+              <a:ext uri="{FF2B5EF4-FFF2-40B4-BE49-F238E27FC236}">
+                <a16:creationId xmlns:a16="http://schemas.microsoft.com/office/drawing/2014/main" id="{EC8935AC-E691-CEFB-B8DB-AB324127959F}"/>
+              </a:ext>
+            </a:extLst>
+          </p:cNvPr>
+          <p:cNvPicPr>
+            <a:picLocks noChangeAspect="1"/>
+          </p:cNvPicPr>
+          <p:nvPr/>
+        </p:nvPicPr>
+        <p:blipFill>
+          <a:blip r:embed="rId3"/>
+          <a:stretch>
+            <a:fillRect/>
+          </a:stretch>
+        </p:blipFill>
+        <p:spPr>
+          <a:xfrm>
+            <a:off x="825945" y="133609"/>
+            <a:ext cx="7268589" cy="5391902"/>
+          </a:xfrm>
+          <a:prstGeom prst="rect">
+            <a:avLst/>
+          </a:prstGeom>
+        </p:spPr>
+      </p:pic>
+    </p:spTree>
+    <p:extLst>
+      <p:ext uri="{BB962C8B-B14F-4D97-AF65-F5344CB8AC3E}">
+        <p14:creationId xmlns:p14="http://schemas.microsoft.com/office/powerpoint/2010/main" val="2021323704"/>
       </p:ext>
     </p:extLst>
   </p:cSld>

</xml_diff>